<commit_message>
fix figures in section 31
</commit_message>
<xml_diff>
--- a/ITI/TF/Volume1/media/Figure_31.4.2.1-3.pptx
+++ b/ITI/TF/Volume1/media/Figure_31.4.2.1-3.pptx
@@ -104,6 +104,11 @@
       </a:defRPr>
     </a:lvl9pPr>
   </p:defaultTextStyle>
+  <p:extLst>
+    <p:ext uri="{EFAFB233-063F-42B5-8137-9DF3F51BA10A}">
+      <p15:sldGuideLst xmlns:p15="http://schemas.microsoft.com/office/powerpoint/2012/main"/>
+    </p:ext>
+  </p:extLst>
 </p:presentation>
 </file>
 
@@ -254,7 +259,7 @@
           <a:p>
             <a:fld id="{42837413-4718-AD46-B77C-A670857B214D}" type="datetimeFigureOut">
               <a:rPr lang="en-US" smtClean="0"/>
-              <a:t>8/25/20</a:t>
+              <a:t>11/17/2020</a:t>
             </a:fld>
             <a:endParaRPr lang="en-US"/>
           </a:p>
@@ -452,7 +457,7 @@
           <a:p>
             <a:fld id="{42837413-4718-AD46-B77C-A670857B214D}" type="datetimeFigureOut">
               <a:rPr lang="en-US" smtClean="0"/>
-              <a:t>8/25/20</a:t>
+              <a:t>11/17/2020</a:t>
             </a:fld>
             <a:endParaRPr lang="en-US"/>
           </a:p>
@@ -660,7 +665,7 @@
           <a:p>
             <a:fld id="{42837413-4718-AD46-B77C-A670857B214D}" type="datetimeFigureOut">
               <a:rPr lang="en-US" smtClean="0"/>
-              <a:t>8/25/20</a:t>
+              <a:t>11/17/2020</a:t>
             </a:fld>
             <a:endParaRPr lang="en-US"/>
           </a:p>
@@ -858,7 +863,7 @@
           <a:p>
             <a:fld id="{42837413-4718-AD46-B77C-A670857B214D}" type="datetimeFigureOut">
               <a:rPr lang="en-US" smtClean="0"/>
-              <a:t>8/25/20</a:t>
+              <a:t>11/17/2020</a:t>
             </a:fld>
             <a:endParaRPr lang="en-US"/>
           </a:p>
@@ -1133,7 +1138,7 @@
           <a:p>
             <a:fld id="{42837413-4718-AD46-B77C-A670857B214D}" type="datetimeFigureOut">
               <a:rPr lang="en-US" smtClean="0"/>
-              <a:t>8/25/20</a:t>
+              <a:t>11/17/2020</a:t>
             </a:fld>
             <a:endParaRPr lang="en-US"/>
           </a:p>
@@ -1398,7 +1403,7 @@
           <a:p>
             <a:fld id="{42837413-4718-AD46-B77C-A670857B214D}" type="datetimeFigureOut">
               <a:rPr lang="en-US" smtClean="0"/>
-              <a:t>8/25/20</a:t>
+              <a:t>11/17/2020</a:t>
             </a:fld>
             <a:endParaRPr lang="en-US"/>
           </a:p>
@@ -1810,7 +1815,7 @@
           <a:p>
             <a:fld id="{42837413-4718-AD46-B77C-A670857B214D}" type="datetimeFigureOut">
               <a:rPr lang="en-US" smtClean="0"/>
-              <a:t>8/25/20</a:t>
+              <a:t>11/17/2020</a:t>
             </a:fld>
             <a:endParaRPr lang="en-US"/>
           </a:p>
@@ -1951,7 +1956,7 @@
           <a:p>
             <a:fld id="{42837413-4718-AD46-B77C-A670857B214D}" type="datetimeFigureOut">
               <a:rPr lang="en-US" smtClean="0"/>
-              <a:t>8/25/20</a:t>
+              <a:t>11/17/2020</a:t>
             </a:fld>
             <a:endParaRPr lang="en-US"/>
           </a:p>
@@ -2064,7 +2069,7 @@
           <a:p>
             <a:fld id="{42837413-4718-AD46-B77C-A670857B214D}" type="datetimeFigureOut">
               <a:rPr lang="en-US" smtClean="0"/>
-              <a:t>8/25/20</a:t>
+              <a:t>11/17/2020</a:t>
             </a:fld>
             <a:endParaRPr lang="en-US"/>
           </a:p>
@@ -2375,7 +2380,7 @@
           <a:p>
             <a:fld id="{42837413-4718-AD46-B77C-A670857B214D}" type="datetimeFigureOut">
               <a:rPr lang="en-US" smtClean="0"/>
-              <a:t>8/25/20</a:t>
+              <a:t>11/17/2020</a:t>
             </a:fld>
             <a:endParaRPr lang="en-US"/>
           </a:p>
@@ -2663,7 +2668,7 @@
           <a:p>
             <a:fld id="{42837413-4718-AD46-B77C-A670857B214D}" type="datetimeFigureOut">
               <a:rPr lang="en-US" smtClean="0"/>
-              <a:t>8/25/20</a:t>
+              <a:t>11/17/2020</a:t>
             </a:fld>
             <a:endParaRPr lang="en-US"/>
           </a:p>
@@ -2904,7 +2909,7 @@
           <a:p>
             <a:fld id="{42837413-4718-AD46-B77C-A670857B214D}" type="datetimeFigureOut">
               <a:rPr lang="en-US" smtClean="0"/>
-              <a:t>8/25/20</a:t>
+              <a:t>11/17/2020</a:t>
             </a:fld>
             <a:endParaRPr lang="en-US"/>
           </a:p>
@@ -3323,14 +3328,16 @@
       </p:grpSpPr>
       <p:pic>
         <p:nvPicPr>
-          <p:cNvPr id="4" name="Picture 3" descr="XPID Diagram-4">
-            <a:extLst>
-              <a:ext uri="{FF2B5EF4-FFF2-40B4-BE49-F238E27FC236}">
-                <a16:creationId xmlns:a16="http://schemas.microsoft.com/office/drawing/2014/main" id="{A67AD7DF-17FA-FA42-BB3F-61EDC5891152}"/>
-              </a:ext>
-            </a:extLst>
-          </p:cNvPr>
-          <p:cNvPicPr/>
+          <p:cNvPr id="3" name="Picture 2" descr="XPID Diagram-5">
+            <a:extLst>
+              <a:ext uri="{FF2B5EF4-FFF2-40B4-BE49-F238E27FC236}">
+                <a16:creationId xmlns:a16="http://schemas.microsoft.com/office/drawing/2014/main" id="{B074A2A5-471E-42FF-B0DB-B49E8A2D4D81}"/>
+              </a:ext>
+            </a:extLst>
+          </p:cNvPr>
+          <p:cNvPicPr>
+            <a:picLocks noChangeAspect="1"/>
+          </p:cNvPicPr>
           <p:nvPr/>
         </p:nvPicPr>
         <p:blipFill>
@@ -3348,8 +3355,8 @@
         </p:blipFill>
         <p:spPr bwMode="auto">
           <a:xfrm>
-            <a:off x="4111625" y="1891982"/>
-            <a:ext cx="3968750" cy="3074035"/>
+            <a:off x="647642" y="1226373"/>
+            <a:ext cx="10910024" cy="4410634"/>
           </a:xfrm>
           <a:prstGeom prst="rect">
             <a:avLst/>

</xml_diff>